<commit_message>
Add demo for day 4 from day 3. Better slides for day 4. Add extension method in day 3
</commit_message>
<xml_diff>
--- a/Slides/4. Day 3 - Events, Async, Parallelism.pptx
+++ b/Slides/4. Day 3 - Events, Async, Parallelism.pptx
@@ -5,7 +5,7 @@
     <p:sldMasterId id="2147483660" r:id="rId1"/>
   </p:sldMasterIdLst>
   <p:notesMasterIdLst>
-    <p:notesMasterId r:id="rId17"/>
+    <p:notesMasterId r:id="rId19"/>
   </p:notesMasterIdLst>
   <p:sldIdLst>
     <p:sldId id="256" r:id="rId2"/>
@@ -16,13 +16,15 @@
     <p:sldId id="261" r:id="rId7"/>
     <p:sldId id="262" r:id="rId8"/>
     <p:sldId id="263" r:id="rId9"/>
-    <p:sldId id="264" r:id="rId10"/>
-    <p:sldId id="265" r:id="rId11"/>
-    <p:sldId id="266" r:id="rId12"/>
-    <p:sldId id="267" r:id="rId13"/>
-    <p:sldId id="268" r:id="rId14"/>
-    <p:sldId id="269" r:id="rId15"/>
-    <p:sldId id="270" r:id="rId16"/>
+    <p:sldId id="271" r:id="rId10"/>
+    <p:sldId id="272" r:id="rId11"/>
+    <p:sldId id="264" r:id="rId12"/>
+    <p:sldId id="265" r:id="rId13"/>
+    <p:sldId id="266" r:id="rId14"/>
+    <p:sldId id="267" r:id="rId15"/>
+    <p:sldId id="268" r:id="rId16"/>
+    <p:sldId id="269" r:id="rId17"/>
+    <p:sldId id="270" r:id="rId18"/>
   </p:sldIdLst>
   <p:sldSz cx="9144000" cy="5143500" type="screen16x9"/>
   <p:notesSz cx="6858000" cy="9144000"/>
@@ -21687,7 +21689,7 @@
             <a:fld id="{B61BEF0D-F0BB-DE4B-95CE-6DB70DBA9567}" type="datetimeFigureOut">
               <a:rPr lang="en-US" dirty="0"/>
               <a:pPr/>
-              <a:t>6/8/2025</a:t>
+              <a:t>6/9/2025</a:t>
             </a:fld>
             <a:endParaRPr lang="en-US" dirty="0"/>
           </a:p>
@@ -21949,7 +21951,7 @@
             <a:fld id="{B61BEF0D-F0BB-DE4B-95CE-6DB70DBA9567}" type="datetimeFigureOut">
               <a:rPr lang="en-US" dirty="0"/>
               <a:pPr/>
-              <a:t>6/8/2025</a:t>
+              <a:t>6/9/2025</a:t>
             </a:fld>
             <a:endParaRPr lang="en-US" dirty="0"/>
           </a:p>
@@ -22274,7 +22276,7 @@
             <a:fld id="{B61BEF0D-F0BB-DE4B-95CE-6DB70DBA9567}" type="datetimeFigureOut">
               <a:rPr lang="en-US" dirty="0"/>
               <a:pPr/>
-              <a:t>6/8/2025</a:t>
+              <a:t>6/9/2025</a:t>
             </a:fld>
             <a:endParaRPr lang="en-US" dirty="0"/>
           </a:p>
@@ -22626,7 +22628,7 @@
             <a:fld id="{B61BEF0D-F0BB-DE4B-95CE-6DB70DBA9567}" type="datetimeFigureOut">
               <a:rPr lang="en-US" dirty="0"/>
               <a:pPr/>
-              <a:t>6/8/2025</a:t>
+              <a:t>6/9/2025</a:t>
             </a:fld>
             <a:endParaRPr lang="en-US" dirty="0"/>
           </a:p>
@@ -22951,7 +22953,7 @@
             <a:fld id="{B61BEF0D-F0BB-DE4B-95CE-6DB70DBA9567}" type="datetimeFigureOut">
               <a:rPr lang="en-US" dirty="0"/>
               <a:pPr/>
-              <a:t>6/8/2025</a:t>
+              <a:t>6/9/2025</a:t>
             </a:fld>
             <a:endParaRPr lang="en-US" dirty="0"/>
           </a:p>
@@ -23355,7 +23357,7 @@
             <a:fld id="{B61BEF0D-F0BB-DE4B-95CE-6DB70DBA9567}" type="datetimeFigureOut">
               <a:rPr lang="en-US" dirty="0"/>
               <a:pPr/>
-              <a:t>6/8/2025</a:t>
+              <a:t>6/9/2025</a:t>
             </a:fld>
             <a:endParaRPr lang="en-US" dirty="0"/>
           </a:p>
@@ -23535,7 +23537,7 @@
           <a:p>
             <a:fld id="{55C6B4A9-1611-4792-9094-5F34BCA07E0B}" type="datetimeFigureOut">
               <a:rPr lang="en-US" dirty="0"/>
-              <a:t>6/8/2025</a:t>
+              <a:t>6/9/2025</a:t>
             </a:fld>
             <a:endParaRPr lang="en-US" dirty="0"/>
           </a:p>
@@ -23726,7 +23728,7 @@
             <a:fld id="{B61BEF0D-F0BB-DE4B-95CE-6DB70DBA9567}" type="datetimeFigureOut">
               <a:rPr lang="en-US" dirty="0"/>
               <a:pPr/>
-              <a:t>6/8/2025</a:t>
+              <a:t>6/9/2025</a:t>
             </a:fld>
             <a:endParaRPr lang="en-US" dirty="0"/>
           </a:p>
@@ -24280,7 +24282,7 @@
             <a:fld id="{B61BEF0D-F0BB-DE4B-95CE-6DB70DBA9567}" type="datetimeFigureOut">
               <a:rPr lang="en-US" dirty="0"/>
               <a:pPr/>
-              <a:t>6/8/2025</a:t>
+              <a:t>6/9/2025</a:t>
             </a:fld>
             <a:endParaRPr lang="en-US" dirty="0"/>
           </a:p>
@@ -24538,7 +24540,7 @@
             <a:fld id="{B61BEF0D-F0BB-DE4B-95CE-6DB70DBA9567}" type="datetimeFigureOut">
               <a:rPr lang="en-US" dirty="0"/>
               <a:pPr/>
-              <a:t>6/8/2025</a:t>
+              <a:t>6/9/2025</a:t>
             </a:fld>
             <a:endParaRPr lang="en-US" dirty="0"/>
           </a:p>
@@ -24780,7 +24782,7 @@
           <a:p>
             <a:fld id="{EB712588-04B1-427B-82EE-E8DB90309F08}" type="datetimeFigureOut">
               <a:rPr lang="en-US" dirty="0"/>
-              <a:t>6/8/2025</a:t>
+              <a:t>6/9/2025</a:t>
             </a:fld>
             <a:endParaRPr lang="en-US" dirty="0"/>
           </a:p>
@@ -25165,7 +25167,7 @@
             <a:fld id="{B61BEF0D-F0BB-DE4B-95CE-6DB70DBA9567}" type="datetimeFigureOut">
               <a:rPr lang="en-US" dirty="0"/>
               <a:pPr/>
-              <a:t>6/8/2025</a:t>
+              <a:t>6/9/2025</a:t>
             </a:fld>
             <a:endParaRPr lang="en-US" dirty="0"/>
           </a:p>
@@ -25299,7 +25301,7 @@
             <a:fld id="{B61BEF0D-F0BB-DE4B-95CE-6DB70DBA9567}" type="datetimeFigureOut">
               <a:rPr lang="en-US" dirty="0"/>
               <a:pPr/>
-              <a:t>6/8/2025</a:t>
+              <a:t>6/9/2025</a:t>
             </a:fld>
             <a:endParaRPr lang="en-US" dirty="0"/>
           </a:p>
@@ -25405,7 +25407,7 @@
             <a:fld id="{B61BEF0D-F0BB-DE4B-95CE-6DB70DBA9567}" type="datetimeFigureOut">
               <a:rPr lang="en-US" dirty="0"/>
               <a:pPr/>
-              <a:t>6/8/2025</a:t>
+              <a:t>6/9/2025</a:t>
             </a:fld>
             <a:endParaRPr lang="en-US" dirty="0"/>
           </a:p>
@@ -25669,7 +25671,7 @@
           <a:p>
             <a:fld id="{42A54C80-263E-416B-A8E0-580EDEADCBDC}" type="datetimeFigureOut">
               <a:rPr lang="en-US" dirty="0"/>
-              <a:t>6/8/2025</a:t>
+              <a:t>6/9/2025</a:t>
             </a:fld>
             <a:endParaRPr lang="en-US" dirty="0"/>
           </a:p>
@@ -25943,7 +25945,7 @@
             <a:fld id="{B61BEF0D-F0BB-DE4B-95CE-6DB70DBA9567}" type="datetimeFigureOut">
               <a:rPr lang="en-US" dirty="0"/>
               <a:pPr/>
-              <a:t>6/8/2025</a:t>
+              <a:t>6/9/2025</a:t>
             </a:fld>
             <a:endParaRPr lang="en-US" dirty="0"/>
           </a:p>
@@ -26697,7 +26699,7 @@
             <a:fld id="{B61BEF0D-F0BB-DE4B-95CE-6DB70DBA9567}" type="datetimeFigureOut">
               <a:rPr lang="en-US" dirty="0"/>
               <a:pPr/>
-              <a:t>6/8/2025</a:t>
+              <a:t>6/9/2025</a:t>
             </a:fld>
             <a:endParaRPr lang="en-US" dirty="0"/>
           </a:p>
@@ -27568,6 +27570,310 @@
 </file>
 
 <file path=ppt/slides/slide10.xml><?xml version="1.0" encoding="utf-8"?>
+<p:sld xmlns:a="http://schemas.openxmlformats.org/drawingml/2006/main" xmlns:r="http://schemas.openxmlformats.org/officeDocument/2006/relationships" xmlns:p="http://schemas.openxmlformats.org/presentationml/2006/main">
+  <p:cSld>
+    <p:spTree>
+      <p:nvGrpSpPr>
+        <p:cNvPr id="1" name=""/>
+        <p:cNvGrpSpPr/>
+        <p:nvPr/>
+      </p:nvGrpSpPr>
+      <p:grpSpPr>
+        <a:xfrm>
+          <a:off x="0" y="0"/>
+          <a:ext cx="0" cy="0"/>
+          <a:chOff x="0" y="0"/>
+          <a:chExt cx="0" cy="0"/>
+        </a:xfrm>
+      </p:grpSpPr>
+      <p:sp>
+        <p:nvSpPr>
+          <p:cNvPr id="2" name="Title 1">
+            <a:extLst>
+              <a:ext uri="{FF2B5EF4-FFF2-40B4-BE49-F238E27FC236}">
+                <a16:creationId xmlns:a16="http://schemas.microsoft.com/office/drawing/2014/main" id="{4CE0506E-3FA4-7C2F-4D78-9CB1534A47B7}"/>
+              </a:ext>
+            </a:extLst>
+          </p:cNvPr>
+          <p:cNvSpPr>
+            <a:spLocks noGrp="1"/>
+          </p:cNvSpPr>
+          <p:nvPr>
+            <p:ph type="title"/>
+          </p:nvPr>
+        </p:nvSpPr>
+        <p:spPr/>
+        <p:txBody>
+          <a:bodyPr/>
+          <a:lstStyle/>
+          <a:p>
+            <a:r>
+              <a:rPr lang="en-US" dirty="0"/>
+              <a:t>Extension Methods</a:t>
+            </a:r>
+          </a:p>
+        </p:txBody>
+      </p:sp>
+      <p:pic>
+        <p:nvPicPr>
+          <p:cNvPr id="5" name="Content Placeholder 4">
+            <a:extLst>
+              <a:ext uri="{FF2B5EF4-FFF2-40B4-BE49-F238E27FC236}">
+                <a16:creationId xmlns:a16="http://schemas.microsoft.com/office/drawing/2014/main" id="{B0C92EC2-F419-151B-789C-1E456576AFF0}"/>
+              </a:ext>
+            </a:extLst>
+          </p:cNvPr>
+          <p:cNvPicPr>
+            <a:picLocks noGrp="1" noChangeAspect="1"/>
+          </p:cNvPicPr>
+          <p:nvPr>
+            <p:ph idx="1"/>
+          </p:nvPr>
+        </p:nvPicPr>
+        <p:blipFill>
+          <a:blip r:embed="rId2"/>
+          <a:stretch>
+            <a:fillRect/>
+          </a:stretch>
+        </p:blipFill>
+        <p:spPr>
+          <a:xfrm>
+            <a:off x="508000" y="1623006"/>
+            <a:ext cx="6446838" cy="2905550"/>
+          </a:xfrm>
+        </p:spPr>
+      </p:pic>
+    </p:spTree>
+    <p:extLst>
+      <p:ext uri="{BB962C8B-B14F-4D97-AF65-F5344CB8AC3E}">
+        <p14:creationId xmlns:p14="http://schemas.microsoft.com/office/powerpoint/2010/main" val="4285453900"/>
+      </p:ext>
+    </p:extLst>
+  </p:cSld>
+  <p:clrMapOvr>
+    <a:masterClrMapping/>
+  </p:clrMapOvr>
+</p:sld>
+</file>
+
+<file path=ppt/slides/slide11.xml><?xml version="1.0" encoding="utf-8"?>
+<p:sld xmlns:a="http://schemas.openxmlformats.org/drawingml/2006/main" xmlns:r="http://schemas.openxmlformats.org/officeDocument/2006/relationships" xmlns:p="http://schemas.openxmlformats.org/presentationml/2006/main">
+  <p:cSld>
+    <p:bg>
+      <p:bgPr>
+        <a:solidFill>
+          <a:schemeClr val="bg1"/>
+        </a:solidFill>
+        <a:effectLst/>
+      </p:bgPr>
+    </p:bg>
+    <p:spTree>
+      <p:nvGrpSpPr>
+        <p:cNvPr id="1" name="Shape 104"/>
+        <p:cNvGrpSpPr/>
+        <p:nvPr/>
+      </p:nvGrpSpPr>
+      <p:grpSpPr>
+        <a:xfrm>
+          <a:off x="0" y="0"/>
+          <a:ext cx="0" cy="0"/>
+          <a:chOff x="0" y="0"/>
+          <a:chExt cx="0" cy="0"/>
+        </a:xfrm>
+      </p:grpSpPr>
+      <p:sp>
+        <p:nvSpPr>
+          <p:cNvPr id="105" name="Google Shape;105;p21"/>
+          <p:cNvSpPr txBox="1">
+            <a:spLocks noGrp="1"/>
+          </p:cNvSpPr>
+          <p:nvPr>
+            <p:ph type="ctrTitle"/>
+          </p:nvPr>
+        </p:nvSpPr>
+        <p:spPr>
+          <a:xfrm>
+            <a:off x="3730752" y="948985"/>
+            <a:ext cx="3224750" cy="2436848"/>
+          </a:xfrm>
+          <a:prstGeom prst="rect">
+            <a:avLst/>
+          </a:prstGeom>
+        </p:spPr>
+        <p:txBody>
+          <a:bodyPr spcFirstLastPara="1" lIns="91425" tIns="91425" rIns="91425" bIns="91425" anchorCtr="0">
+            <a:normAutofit/>
+          </a:bodyPr>
+          <a:lstStyle/>
+          <a:p>
+            <a:pPr marL="0" lvl="0" indent="0" algn="l" rtl="0">
+              <a:spcBef>
+                <a:spcPts val="0"/>
+              </a:spcBef>
+              <a:spcAft>
+                <a:spcPts val="0"/>
+              </a:spcAft>
+              <a:buNone/>
+            </a:pPr>
+            <a:r>
+              <a:rPr lang="en"/>
+              <a:t>Async/Await</a:t>
+            </a:r>
+            <a:endParaRPr lang="en-US"/>
+          </a:p>
+        </p:txBody>
+      </p:sp>
+      <p:sp>
+        <p:nvSpPr>
+          <p:cNvPr id="106" name="Google Shape;106;p21"/>
+          <p:cNvSpPr txBox="1">
+            <a:spLocks noGrp="1"/>
+          </p:cNvSpPr>
+          <p:nvPr>
+            <p:ph type="subTitle" idx="1"/>
+          </p:nvPr>
+        </p:nvSpPr>
+        <p:spPr>
+          <a:xfrm>
+            <a:off x="3730752" y="3385834"/>
+            <a:ext cx="3224749" cy="653282"/>
+          </a:xfrm>
+          <a:prstGeom prst="rect">
+            <a:avLst/>
+          </a:prstGeom>
+        </p:spPr>
+        <p:txBody>
+          <a:bodyPr spcFirstLastPara="1" lIns="91425" tIns="91425" rIns="91425" bIns="91425" anchorCtr="0">
+            <a:normAutofit/>
+          </a:bodyPr>
+          <a:lstStyle/>
+          <a:p>
+            <a:pPr marL="0" lvl="0" indent="0" algn="l" rtl="0">
+              <a:spcBef>
+                <a:spcPts val="0"/>
+              </a:spcBef>
+              <a:spcAft>
+                <a:spcPts val="0"/>
+              </a:spcAft>
+              <a:buNone/>
+            </a:pPr>
+            <a:endParaRPr lang="en-US"/>
+          </a:p>
+        </p:txBody>
+      </p:sp>
+      <p:sp>
+        <p:nvSpPr>
+          <p:cNvPr id="113" name="Isosceles Triangle 112">
+            <a:extLst>
+              <a:ext uri="{FF2B5EF4-FFF2-40B4-BE49-F238E27FC236}">
+                <a16:creationId xmlns:a16="http://schemas.microsoft.com/office/drawing/2014/main" id="{5A7802B6-FF37-40CF-A7E2-6F2A0D9A91EF}"/>
+              </a:ext>
+              <a:ext uri="{C183D7F6-B498-43B3-948B-1728B52AA6E4}">
+                <adec:decorative xmlns:adec="http://schemas.microsoft.com/office/drawing/2017/decorative" val="1"/>
+              </a:ext>
+            </a:extLst>
+          </p:cNvPr>
+          <p:cNvSpPr>
+            <a:spLocks noGrp="1" noRot="1" noChangeAspect="1" noMove="1" noResize="1" noEditPoints="1" noAdjustHandles="1" noChangeArrowheads="1" noChangeShapeType="1" noTextEdit="1"/>
+          </p:cNvSpPr>
+          <p:nvPr>
+            <p:extLst>
+              <p:ext uri="{386F3935-93C4-4BCD-93E2-E3B085C9AB24}">
+                <p16:designElem xmlns:p16="http://schemas.microsoft.com/office/powerpoint/2015/main" val="1"/>
+              </p:ext>
+            </p:extLst>
+          </p:nvPr>
+        </p:nvSpPr>
+        <p:spPr>
+          <a:xfrm rot="10800000">
+            <a:off x="2380" y="9525"/>
+            <a:ext cx="631947" cy="4249615"/>
+          </a:xfrm>
+          <a:prstGeom prst="triangle">
+            <a:avLst>
+              <a:gd name="adj" fmla="val 100000"/>
+            </a:avLst>
+          </a:prstGeom>
+          <a:solidFill>
+            <a:schemeClr val="accent1">
+              <a:alpha val="85000"/>
+            </a:schemeClr>
+          </a:solidFill>
+          <a:ln>
+            <a:noFill/>
+          </a:ln>
+          <a:effectLst/>
+        </p:spPr>
+        <p:style>
+          <a:lnRef idx="1">
+            <a:schemeClr val="accent1"/>
+          </a:lnRef>
+          <a:fillRef idx="3">
+            <a:schemeClr val="accent1"/>
+          </a:fillRef>
+          <a:effectRef idx="2">
+            <a:schemeClr val="accent1"/>
+          </a:effectRef>
+          <a:fontRef idx="minor">
+            <a:schemeClr val="lt1"/>
+          </a:fontRef>
+        </p:style>
+        <p:txBody>
+          <a:bodyPr/>
+          <a:lstStyle/>
+          <a:p>
+            <a:endParaRPr lang="en-US"/>
+          </a:p>
+        </p:txBody>
+      </p:sp>
+      <p:pic>
+        <p:nvPicPr>
+          <p:cNvPr id="110" name="Graphic 109" descr="Stethoscope">
+            <a:extLst>
+              <a:ext uri="{FF2B5EF4-FFF2-40B4-BE49-F238E27FC236}">
+                <a16:creationId xmlns:a16="http://schemas.microsoft.com/office/drawing/2014/main" id="{E9903A2A-6750-BF0F-B01A-4EA02F8F90ED}"/>
+              </a:ext>
+            </a:extLst>
+          </p:cNvPr>
+          <p:cNvPicPr>
+            <a:picLocks noChangeAspect="1"/>
+          </p:cNvPicPr>
+          <p:nvPr/>
+        </p:nvPicPr>
+        <p:blipFill>
+          <a:blip r:embed="rId3">
+            <a:extLst>
+              <a:ext uri="{28A0092B-C50C-407E-A947-70E740481C1C}">
+                <a14:useLocalDpi xmlns:a14="http://schemas.microsoft.com/office/drawing/2010/main" val="0"/>
+              </a:ext>
+              <a:ext uri="{96DAC541-7B7A-43D3-8B79-37D633B846F1}">
+                <asvg:svgBlip xmlns:asvg="http://schemas.microsoft.com/office/drawing/2016/SVG/main" r:embed="rId4"/>
+              </a:ext>
+            </a:extLst>
+          </a:blip>
+          <a:stretch>
+            <a:fillRect/>
+          </a:stretch>
+        </p:blipFill>
+        <p:spPr>
+          <a:xfrm>
+            <a:off x="666453" y="1162604"/>
+            <a:ext cx="2824269" cy="2824269"/>
+          </a:xfrm>
+          <a:prstGeom prst="rect">
+            <a:avLst/>
+          </a:prstGeom>
+        </p:spPr>
+      </p:pic>
+    </p:spTree>
+  </p:cSld>
+  <p:clrMapOvr>
+    <a:masterClrMapping/>
+  </p:clrMapOvr>
+</p:sld>
+</file>
+
+<file path=ppt/slides/slide12.xml><?xml version="1.0" encoding="utf-8"?>
 <p:sld xmlns:a="http://schemas.openxmlformats.org/drawingml/2006/main" xmlns:r="http://schemas.openxmlformats.org/officeDocument/2006/relationships" xmlns:p="http://schemas.openxmlformats.org/presentationml/2006/main">
   <p:cSld>
     <p:bg>
@@ -28611,7 +28917,7 @@
 </p:sld>
 </file>
 
-<file path=ppt/slides/slide11.xml><?xml version="1.0" encoding="utf-8"?>
+<file path=ppt/slides/slide13.xml><?xml version="1.0" encoding="utf-8"?>
 <p:sld xmlns:a="http://schemas.openxmlformats.org/drawingml/2006/main" xmlns:r="http://schemas.openxmlformats.org/officeDocument/2006/relationships" xmlns:p="http://schemas.openxmlformats.org/presentationml/2006/main">
   <p:cSld>
     <p:bg>
@@ -29655,7 +29961,7 @@
 </p:sld>
 </file>
 
-<file path=ppt/slides/slide12.xml><?xml version="1.0" encoding="utf-8"?>
+<file path=ppt/slides/slide14.xml><?xml version="1.0" encoding="utf-8"?>
 <p:sld xmlns:a="http://schemas.openxmlformats.org/drawingml/2006/main" xmlns:r="http://schemas.openxmlformats.org/officeDocument/2006/relationships" xmlns:p="http://schemas.openxmlformats.org/presentationml/2006/main">
   <p:cSld>
     <p:spTree>
@@ -29746,7 +30052,7 @@
 </p:sld>
 </file>
 
-<file path=ppt/slides/slide13.xml><?xml version="1.0" encoding="utf-8"?>
+<file path=ppt/slides/slide15.xml><?xml version="1.0" encoding="utf-8"?>
 <p:sld xmlns:a="http://schemas.openxmlformats.org/drawingml/2006/main" xmlns:r="http://schemas.openxmlformats.org/officeDocument/2006/relationships" xmlns:p="http://schemas.openxmlformats.org/presentationml/2006/main">
   <p:cSld>
     <p:bg>
@@ -30790,7 +31096,7 @@
 </p:sld>
 </file>
 
-<file path=ppt/slides/slide14.xml><?xml version="1.0" encoding="utf-8"?>
+<file path=ppt/slides/slide16.xml><?xml version="1.0" encoding="utf-8"?>
 <p:sld xmlns:a="http://schemas.openxmlformats.org/drawingml/2006/main" xmlns:r="http://schemas.openxmlformats.org/officeDocument/2006/relationships" xmlns:p="http://schemas.openxmlformats.org/presentationml/2006/main">
   <p:cSld>
     <p:spTree>
@@ -30889,7 +31195,7 @@
 </p:sld>
 </file>
 
-<file path=ppt/slides/slide15.xml><?xml version="1.0" encoding="utf-8"?>
+<file path=ppt/slides/slide17.xml><?xml version="1.0" encoding="utf-8"?>
 <p:sld xmlns:a="http://schemas.openxmlformats.org/drawingml/2006/main" xmlns:r="http://schemas.openxmlformats.org/officeDocument/2006/relationships" xmlns:p="http://schemas.openxmlformats.org/presentationml/2006/main">
   <p:cSld>
     <p:spTree>
@@ -35668,20 +35974,12 @@
               <a:t>Register and </a:t>
             </a:r>
             <a:r>
-              <a:rPr lang="en-US">
-                <a:solidFill>
-                  <a:schemeClr val="tx1"/>
-                </a:solidFill>
-              </a:rPr>
-              <a:t>Console</a:t>
-            </a:r>
-            <a:r>
               <a:rPr lang="en-US" dirty="0" err="1">
                 <a:solidFill>
                   <a:schemeClr val="tx1"/>
                 </a:solidFill>
               </a:rPr>
-              <a:t>.WriteLine</a:t>
+              <a:t>Console.WriteLine</a:t>
             </a:r>
             <a:r>
               <a:rPr lang="en-US" dirty="0">
@@ -35747,17 +36045,9 @@
 <file path=ppt/slides/slide9.xml><?xml version="1.0" encoding="utf-8"?>
 <p:sld xmlns:a="http://schemas.openxmlformats.org/drawingml/2006/main" xmlns:r="http://schemas.openxmlformats.org/officeDocument/2006/relationships" xmlns:p="http://schemas.openxmlformats.org/presentationml/2006/main">
   <p:cSld>
-    <p:bg>
-      <p:bgPr>
-        <a:solidFill>
-          <a:schemeClr val="bg1"/>
-        </a:solidFill>
-        <a:effectLst/>
-      </p:bgPr>
-    </p:bg>
     <p:spTree>
       <p:nvGrpSpPr>
-        <p:cNvPr id="1" name="Shape 104"/>
+        <p:cNvPr id="1" name=""/>
         <p:cNvGrpSpPr/>
         <p:nvPr/>
       </p:nvGrpSpPr>
@@ -35771,189 +36061,175 @@
       </p:grpSpPr>
       <p:sp>
         <p:nvSpPr>
-          <p:cNvPr id="105" name="Google Shape;105;p21"/>
-          <p:cNvSpPr txBox="1">
+          <p:cNvPr id="2" name="Title 1">
+            <a:extLst>
+              <a:ext uri="{FF2B5EF4-FFF2-40B4-BE49-F238E27FC236}">
+                <a16:creationId xmlns:a16="http://schemas.microsoft.com/office/drawing/2014/main" id="{C05F6139-9866-DBFA-DED1-2EB0F8A1EE21}"/>
+              </a:ext>
+            </a:extLst>
+          </p:cNvPr>
+          <p:cNvSpPr>
             <a:spLocks noGrp="1"/>
           </p:cNvSpPr>
           <p:nvPr>
-            <p:ph type="ctrTitle"/>
+            <p:ph type="title"/>
           </p:nvPr>
         </p:nvSpPr>
-        <p:spPr>
-          <a:xfrm>
-            <a:off x="3730752" y="948985"/>
-            <a:ext cx="3224750" cy="2436848"/>
-          </a:xfrm>
-          <a:prstGeom prst="rect">
-            <a:avLst/>
-          </a:prstGeom>
-        </p:spPr>
+        <p:spPr/>
         <p:txBody>
-          <a:bodyPr spcFirstLastPara="1" lIns="91425" tIns="91425" rIns="91425" bIns="91425" anchorCtr="0">
-            <a:normAutofit/>
-          </a:bodyPr>
+          <a:bodyPr/>
           <a:lstStyle/>
           <a:p>
-            <a:pPr marL="0" lvl="0" indent="0" algn="l" rtl="0">
-              <a:spcBef>
-                <a:spcPts val="0"/>
-              </a:spcBef>
-              <a:spcAft>
-                <a:spcPts val="0"/>
-              </a:spcAft>
-              <a:buNone/>
-            </a:pPr>
             <a:r>
-              <a:rPr lang="en"/>
-              <a:t>Async/Await</a:t>
+              <a:rPr lang="en-US" dirty="0"/>
+              <a:t>Extension Methods</a:t>
             </a:r>
-            <a:endParaRPr lang="en-US"/>
           </a:p>
         </p:txBody>
       </p:sp>
       <p:sp>
         <p:nvSpPr>
-          <p:cNvPr id="106" name="Google Shape;106;p21"/>
-          <p:cNvSpPr txBox="1">
-            <a:spLocks noGrp="1"/>
-          </p:cNvSpPr>
-          <p:nvPr>
-            <p:ph type="subTitle" idx="1"/>
-          </p:nvPr>
-        </p:nvSpPr>
-        <p:spPr>
-          <a:xfrm>
-            <a:off x="3730752" y="3385834"/>
-            <a:ext cx="3224749" cy="653282"/>
-          </a:xfrm>
-          <a:prstGeom prst="rect">
-            <a:avLst/>
-          </a:prstGeom>
-        </p:spPr>
-        <p:txBody>
-          <a:bodyPr spcFirstLastPara="1" lIns="91425" tIns="91425" rIns="91425" bIns="91425" anchorCtr="0">
-            <a:normAutofit/>
-          </a:bodyPr>
-          <a:lstStyle/>
-          <a:p>
-            <a:pPr marL="0" lvl="0" indent="0" algn="l" rtl="0">
-              <a:spcBef>
-                <a:spcPts val="0"/>
-              </a:spcBef>
-              <a:spcAft>
-                <a:spcPts val="0"/>
-              </a:spcAft>
-              <a:buNone/>
-            </a:pPr>
-            <a:endParaRPr lang="en-US"/>
-          </a:p>
-        </p:txBody>
-      </p:sp>
-      <p:sp>
-        <p:nvSpPr>
-          <p:cNvPr id="113" name="Isosceles Triangle 112">
+          <p:cNvPr id="3" name="Content Placeholder 2">
             <a:extLst>
               <a:ext uri="{FF2B5EF4-FFF2-40B4-BE49-F238E27FC236}">
-                <a16:creationId xmlns:a16="http://schemas.microsoft.com/office/drawing/2014/main" id="{5A7802B6-FF37-40CF-A7E2-6F2A0D9A91EF}"/>
-              </a:ext>
-              <a:ext uri="{C183D7F6-B498-43B3-948B-1728B52AA6E4}">
-                <adec:decorative xmlns:adec="http://schemas.microsoft.com/office/drawing/2017/decorative" val="1"/>
+                <a16:creationId xmlns:a16="http://schemas.microsoft.com/office/drawing/2014/main" id="{3CA5B5B3-87E9-9F8A-DB5D-A903AD890C15}"/>
               </a:ext>
             </a:extLst>
           </p:cNvPr>
           <p:cNvSpPr>
-            <a:spLocks noGrp="1" noRot="1" noChangeAspect="1" noMove="1" noResize="1" noEditPoints="1" noAdjustHandles="1" noChangeArrowheads="1" noChangeShapeType="1" noTextEdit="1"/>
+            <a:spLocks noGrp="1"/>
           </p:cNvSpPr>
           <p:nvPr>
-            <p:extLst>
-              <p:ext uri="{386F3935-93C4-4BCD-93E2-E3B085C9AB24}">
-                <p16:designElem xmlns:p16="http://schemas.microsoft.com/office/powerpoint/2015/main" val="1"/>
-              </p:ext>
-            </p:extLst>
+            <p:ph idx="1"/>
           </p:nvPr>
         </p:nvSpPr>
-        <p:spPr>
-          <a:xfrm rot="10800000">
-            <a:off x="2380" y="9525"/>
-            <a:ext cx="631947" cy="4249615"/>
-          </a:xfrm>
-          <a:prstGeom prst="triangle">
-            <a:avLst>
-              <a:gd name="adj" fmla="val 100000"/>
-            </a:avLst>
-          </a:prstGeom>
-          <a:solidFill>
-            <a:schemeClr val="accent1">
-              <a:alpha val="85000"/>
-            </a:schemeClr>
-          </a:solidFill>
-          <a:ln>
-            <a:noFill/>
-          </a:ln>
-          <a:effectLst/>
-        </p:spPr>
-        <p:style>
-          <a:lnRef idx="1">
-            <a:schemeClr val="accent1"/>
-          </a:lnRef>
-          <a:fillRef idx="3">
-            <a:schemeClr val="accent1"/>
-          </a:fillRef>
-          <a:effectRef idx="2">
-            <a:schemeClr val="accent1"/>
-          </a:effectRef>
-          <a:fontRef idx="minor">
-            <a:schemeClr val="lt1"/>
-          </a:fontRef>
-        </p:style>
+        <p:spPr/>
         <p:txBody>
           <a:bodyPr/>
           <a:lstStyle/>
           <a:p>
-            <a:endParaRPr lang="en-US"/>
+            <a:pPr>
+              <a:lnSpc>
+                <a:spcPct val="200000"/>
+              </a:lnSpc>
+            </a:pPr>
+            <a:r>
+              <a:rPr lang="en-US" dirty="0"/>
+              <a:t>A way to “extend” the functionality of an object</a:t>
+            </a:r>
+          </a:p>
+          <a:p>
+            <a:pPr>
+              <a:lnSpc>
+                <a:spcPct val="200000"/>
+              </a:lnSpc>
+            </a:pPr>
+            <a:r>
+              <a:rPr lang="en-US" b="1" dirty="0"/>
+              <a:t>public static </a:t>
+            </a:r>
+            <a:r>
+              <a:rPr lang="en-US" dirty="0"/>
+              <a:t>&lt;</a:t>
+            </a:r>
+            <a:r>
+              <a:rPr lang="en-US" dirty="0" err="1"/>
+              <a:t>return_value</a:t>
+            </a:r>
+            <a:r>
+              <a:rPr lang="en-US" dirty="0"/>
+              <a:t>&gt; </a:t>
+            </a:r>
+            <a:r>
+              <a:rPr lang="en-US" dirty="0" err="1"/>
+              <a:t>FuncName</a:t>
+            </a:r>
+            <a:r>
+              <a:rPr lang="en-US" dirty="0"/>
+              <a:t>(</a:t>
+            </a:r>
+            <a:r>
+              <a:rPr lang="en-US" b="1" dirty="0"/>
+              <a:t>this</a:t>
+            </a:r>
+            <a:r>
+              <a:rPr lang="en-US" dirty="0"/>
+              <a:t> &lt;</a:t>
+            </a:r>
+            <a:r>
+              <a:rPr lang="en-US" dirty="0" err="1"/>
+              <a:t>object_type</a:t>
+            </a:r>
+            <a:r>
+              <a:rPr lang="en-US" dirty="0"/>
+              <a:t>&gt; &lt;</a:t>
+            </a:r>
+            <a:r>
+              <a:rPr lang="en-US" dirty="0" err="1"/>
+              <a:t>object_name</a:t>
+            </a:r>
+            <a:r>
+              <a:rPr lang="en-US" dirty="0"/>
+              <a:t>&gt;){}</a:t>
+            </a:r>
+          </a:p>
+          <a:p>
+            <a:pPr>
+              <a:lnSpc>
+                <a:spcPct val="200000"/>
+              </a:lnSpc>
+            </a:pPr>
+            <a:r>
+              <a:rPr lang="en-US" dirty="0"/>
+              <a:t>Can be called using: &lt;</a:t>
+            </a:r>
+            <a:r>
+              <a:rPr lang="en-US" dirty="0" err="1"/>
+              <a:t>object_type</a:t>
+            </a:r>
+            <a:r>
+              <a:rPr lang="en-US" dirty="0"/>
+              <a:t>&gt;.</a:t>
+            </a:r>
+            <a:r>
+              <a:rPr lang="en-US" dirty="0" err="1"/>
+              <a:t>FuncName</a:t>
+            </a:r>
+            <a:r>
+              <a:rPr lang="en-US" dirty="0"/>
+              <a:t>(…)</a:t>
+            </a:r>
+          </a:p>
+          <a:p>
+            <a:pPr>
+              <a:lnSpc>
+                <a:spcPct val="200000"/>
+              </a:lnSpc>
+            </a:pPr>
+            <a:r>
+              <a:rPr lang="en-US" dirty="0"/>
+              <a:t>Will show “(extension)” when hovering over the function name</a:t>
+            </a:r>
+          </a:p>
+          <a:p>
+            <a:pPr>
+              <a:lnSpc>
+                <a:spcPct val="200000"/>
+              </a:lnSpc>
+            </a:pPr>
+            <a:r>
+              <a:rPr lang="en-US" b="1" dirty="0"/>
+              <a:t>Only use for small extensions and tools</a:t>
+            </a:r>
           </a:p>
         </p:txBody>
       </p:sp>
-      <p:pic>
-        <p:nvPicPr>
-          <p:cNvPr id="110" name="Graphic 109" descr="Stethoscope">
-            <a:extLst>
-              <a:ext uri="{FF2B5EF4-FFF2-40B4-BE49-F238E27FC236}">
-                <a16:creationId xmlns:a16="http://schemas.microsoft.com/office/drawing/2014/main" id="{E9903A2A-6750-BF0F-B01A-4EA02F8F90ED}"/>
-              </a:ext>
-            </a:extLst>
-          </p:cNvPr>
-          <p:cNvPicPr>
-            <a:picLocks noChangeAspect="1"/>
-          </p:cNvPicPr>
-          <p:nvPr/>
-        </p:nvPicPr>
-        <p:blipFill>
-          <a:blip r:embed="rId3">
-            <a:extLst>
-              <a:ext uri="{28A0092B-C50C-407E-A947-70E740481C1C}">
-                <a14:useLocalDpi xmlns:a14="http://schemas.microsoft.com/office/drawing/2010/main" val="0"/>
-              </a:ext>
-              <a:ext uri="{96DAC541-7B7A-43D3-8B79-37D633B846F1}">
-                <asvg:svgBlip xmlns:asvg="http://schemas.microsoft.com/office/drawing/2016/SVG/main" r:embed="rId4"/>
-              </a:ext>
-            </a:extLst>
-          </a:blip>
-          <a:stretch>
-            <a:fillRect/>
-          </a:stretch>
-        </p:blipFill>
-        <p:spPr>
-          <a:xfrm>
-            <a:off x="666453" y="1162604"/>
-            <a:ext cx="2824269" cy="2824269"/>
-          </a:xfrm>
-          <a:prstGeom prst="rect">
-            <a:avLst/>
-          </a:prstGeom>
-        </p:spPr>
-      </p:pic>
     </p:spTree>
+    <p:extLst>
+      <p:ext uri="{BB962C8B-B14F-4D97-AF65-F5344CB8AC3E}">
+        <p14:creationId xmlns:p14="http://schemas.microsoft.com/office/powerpoint/2010/main" val="3006519698"/>
+      </p:ext>
+    </p:extLst>
   </p:cSld>
   <p:clrMapOvr>
     <a:masterClrMapping/>

</xml_diff>